<commit_message>
Add new & Update ppts.
</commit_message>
<xml_diff>
--- a/chinese/賜福與你.pptx
+++ b/chinese/賜福與你.pptx
@@ -110,6 +110,22 @@
       </a:defRPr>
     </a:lvl9pPr>
   </p:defaultTextStyle>
+  <p:extLst>
+    <p:ext uri="{EFAFB233-063F-42B5-8137-9DF3F51BA10A}">
+      <p15:sldGuideLst xmlns:p15="http://schemas.microsoft.com/office/powerpoint/2012/main">
+        <p15:guide id="1" orient="horz" pos="2160">
+          <p15:clr>
+            <a:srgbClr val="A4A3A4"/>
+          </p15:clr>
+        </p15:guide>
+        <p15:guide id="2" pos="2880">
+          <p15:clr>
+            <a:srgbClr val="A4A3A4"/>
+          </p15:clr>
+        </p15:guide>
+      </p15:sldGuideLst>
+    </p:ext>
+  </p:extLst>
 </p:presentation>
 </file>
 
@@ -295,7 +311,7 @@
             <a:fld id="{576A795A-704C-4B5C-97ED-74D90744CD09}" type="datetimeFigureOut">
               <a:rPr lang="zh-TW" altLang="en-US" smtClean="0"/>
               <a:pPr/>
-              <a:t>2019/1/23</a:t>
+              <a:t>2022/2/5</a:t>
             </a:fld>
             <a:endParaRPr lang="zh-TW" altLang="en-US"/>
           </a:p>
@@ -462,7 +478,7 @@
             <a:fld id="{576A795A-704C-4B5C-97ED-74D90744CD09}" type="datetimeFigureOut">
               <a:rPr lang="zh-TW" altLang="en-US" smtClean="0"/>
               <a:pPr/>
-              <a:t>2019/1/23</a:t>
+              <a:t>2022/2/5</a:t>
             </a:fld>
             <a:endParaRPr lang="zh-TW" altLang="en-US"/>
           </a:p>
@@ -639,7 +655,7 @@
             <a:fld id="{576A795A-704C-4B5C-97ED-74D90744CD09}" type="datetimeFigureOut">
               <a:rPr lang="zh-TW" altLang="en-US" smtClean="0"/>
               <a:pPr/>
-              <a:t>2019/1/23</a:t>
+              <a:t>2022/2/5</a:t>
             </a:fld>
             <a:endParaRPr lang="zh-TW" altLang="en-US"/>
           </a:p>
@@ -806,7 +822,7 @@
             <a:fld id="{576A795A-704C-4B5C-97ED-74D90744CD09}" type="datetimeFigureOut">
               <a:rPr lang="zh-TW" altLang="en-US" smtClean="0"/>
               <a:pPr/>
-              <a:t>2019/1/23</a:t>
+              <a:t>2022/2/5</a:t>
             </a:fld>
             <a:endParaRPr lang="zh-TW" altLang="en-US"/>
           </a:p>
@@ -1049,7 +1065,7 @@
             <a:fld id="{576A795A-704C-4B5C-97ED-74D90744CD09}" type="datetimeFigureOut">
               <a:rPr lang="zh-TW" altLang="en-US" smtClean="0"/>
               <a:pPr/>
-              <a:t>2019/1/23</a:t>
+              <a:t>2022/2/5</a:t>
             </a:fld>
             <a:endParaRPr lang="zh-TW" altLang="en-US"/>
           </a:p>
@@ -1334,7 +1350,7 @@
             <a:fld id="{576A795A-704C-4B5C-97ED-74D90744CD09}" type="datetimeFigureOut">
               <a:rPr lang="zh-TW" altLang="en-US" smtClean="0"/>
               <a:pPr/>
-              <a:t>2019/1/23</a:t>
+              <a:t>2022/2/5</a:t>
             </a:fld>
             <a:endParaRPr lang="zh-TW" altLang="en-US"/>
           </a:p>
@@ -1753,7 +1769,7 @@
             <a:fld id="{576A795A-704C-4B5C-97ED-74D90744CD09}" type="datetimeFigureOut">
               <a:rPr lang="zh-TW" altLang="en-US" smtClean="0"/>
               <a:pPr/>
-              <a:t>2019/1/23</a:t>
+              <a:t>2022/2/5</a:t>
             </a:fld>
             <a:endParaRPr lang="zh-TW" altLang="en-US"/>
           </a:p>
@@ -1868,7 +1884,7 @@
             <a:fld id="{576A795A-704C-4B5C-97ED-74D90744CD09}" type="datetimeFigureOut">
               <a:rPr lang="zh-TW" altLang="en-US" smtClean="0"/>
               <a:pPr/>
-              <a:t>2019/1/23</a:t>
+              <a:t>2022/2/5</a:t>
             </a:fld>
             <a:endParaRPr lang="zh-TW" altLang="en-US"/>
           </a:p>
@@ -1960,7 +1976,7 @@
             <a:fld id="{576A795A-704C-4B5C-97ED-74D90744CD09}" type="datetimeFigureOut">
               <a:rPr lang="zh-TW" altLang="en-US" smtClean="0"/>
               <a:pPr/>
-              <a:t>2019/1/23</a:t>
+              <a:t>2022/2/5</a:t>
             </a:fld>
             <a:endParaRPr lang="zh-TW" altLang="en-US"/>
           </a:p>
@@ -2234,7 +2250,7 @@
             <a:fld id="{576A795A-704C-4B5C-97ED-74D90744CD09}" type="datetimeFigureOut">
               <a:rPr lang="zh-TW" altLang="en-US" smtClean="0"/>
               <a:pPr/>
-              <a:t>2019/1/23</a:t>
+              <a:t>2022/2/5</a:t>
             </a:fld>
             <a:endParaRPr lang="zh-TW" altLang="en-US"/>
           </a:p>
@@ -2488,7 +2504,7 @@
             <a:fld id="{576A795A-704C-4B5C-97ED-74D90744CD09}" type="datetimeFigureOut">
               <a:rPr lang="zh-TW" altLang="en-US" smtClean="0"/>
               <a:pPr/>
-              <a:t>2019/1/23</a:t>
+              <a:t>2022/2/5</a:t>
             </a:fld>
             <a:endParaRPr lang="zh-TW" altLang="en-US"/>
           </a:p>
@@ -2703,7 +2719,7 @@
             <a:fld id="{576A795A-704C-4B5C-97ED-74D90744CD09}" type="datetimeFigureOut">
               <a:rPr lang="zh-TW" altLang="en-US" smtClean="0"/>
               <a:pPr/>
-              <a:t>2019/1/23</a:t>
+              <a:t>2022/2/5</a:t>
             </a:fld>
             <a:endParaRPr lang="zh-TW" altLang="en-US"/>
           </a:p>
@@ -3370,7 +3386,7 @@
           </a:bodyPr>
           <a:lstStyle/>
           <a:p>
-            <a:pPr algn="ctr">
+            <a:pPr>
               <a:buNone/>
             </a:pPr>
             <a:r>
@@ -3389,10 +3405,26 @@
               <a:rPr lang="en-US" sz="4800" dirty="0" err="1" smtClean="0"/>
               <a:t>huì</a:t>
             </a:r>
+            <a:r>
+              <a:rPr lang="en-US" sz="4800" dirty="0" smtClean="0"/>
+              <a:t>  –  </a:t>
+            </a:r>
+            <a:r>
+              <a:rPr lang="en-US" sz="4800" dirty="0" err="1" smtClean="0"/>
+              <a:t>Ân</a:t>
+            </a:r>
+            <a:r>
+              <a:rPr lang="en-US" sz="4800" dirty="0" smtClean="0"/>
+              <a:t> </a:t>
+            </a:r>
+            <a:r>
+              <a:rPr lang="en-US" sz="4800" dirty="0" err="1" smtClean="0"/>
+              <a:t>huệ</a:t>
+            </a:r>
             <a:endParaRPr lang="en-US" altLang="zh-CN" sz="4800" b="1" dirty="0" smtClean="0"/>
           </a:p>
           <a:p>
-            <a:pPr algn="ctr">
+            <a:pPr>
               <a:buNone/>
             </a:pPr>
             <a:r>
@@ -3408,13 +3440,37 @@
               <a:t> </a:t>
             </a:r>
             <a:r>
+              <a:rPr lang="en-US" sz="4800" dirty="0" err="1"/>
+              <a:t>ài</a:t>
+            </a:r>
+            <a:r>
+              <a:rPr lang="en-US" sz="4800" dirty="0"/>
+              <a:t> – </a:t>
+            </a:r>
+            <a:r>
               <a:rPr lang="en-US" sz="4800" dirty="0" err="1" smtClean="0"/>
-              <a:t>ài</a:t>
+              <a:t>lòng</a:t>
+            </a:r>
+            <a:r>
+              <a:rPr lang="en-US" sz="4800" dirty="0" smtClean="0"/>
+              <a:t> </a:t>
+            </a:r>
+            <a:r>
+              <a:rPr lang="en-US" sz="4800" dirty="0" err="1" smtClean="0"/>
+              <a:t>yêu</a:t>
+            </a:r>
+            <a:r>
+              <a:rPr lang="en-US" sz="4800" dirty="0" smtClean="0"/>
+              <a:t> </a:t>
+            </a:r>
+            <a:r>
+              <a:rPr lang="en-US" sz="4800" dirty="0" err="1" smtClean="0"/>
+              <a:t>thương</a:t>
             </a:r>
             <a:endParaRPr lang="en-US" altLang="zh-CN" sz="4800" b="1" dirty="0" smtClean="0"/>
           </a:p>
           <a:p>
-            <a:pPr algn="ctr">
+            <a:pPr>
               <a:buNone/>
             </a:pPr>
             <a:r>
@@ -3430,13 +3486,33 @@
               <a:t> </a:t>
             </a:r>
             <a:r>
+              <a:rPr lang="en-US" sz="4800" dirty="0" err="1"/>
+              <a:t>rào</a:t>
+            </a:r>
+            <a:r>
+              <a:rPr lang="en-US" sz="4800" dirty="0"/>
+              <a:t> </a:t>
+            </a:r>
+            <a:r>
+              <a:rPr lang="en-US" sz="4800" dirty="0" smtClean="0"/>
+              <a:t>– </a:t>
+            </a:r>
+            <a:r>
               <a:rPr lang="en-US" sz="4800" dirty="0" err="1" smtClean="0"/>
-              <a:t>rào</a:t>
-            </a:r>
-            <a:endParaRPr lang="en-US" altLang="zh-CN" sz="4800" b="1" dirty="0" smtClean="0"/>
-          </a:p>
-          <a:p>
-            <a:pPr algn="ctr">
+              <a:t>vây</a:t>
+            </a:r>
+            <a:r>
+              <a:rPr lang="en-US" sz="4800" dirty="0" smtClean="0"/>
+              <a:t> </a:t>
+            </a:r>
+            <a:r>
+              <a:rPr lang="en-US" sz="4800" dirty="0" err="1" smtClean="0"/>
+              <a:t>quanh</a:t>
+            </a:r>
+            <a:endParaRPr lang="en-US" sz="4800" dirty="0" smtClean="0"/>
+          </a:p>
+          <a:p>
+            <a:pPr>
               <a:buNone/>
             </a:pPr>
             <a:r>
@@ -3455,15 +3531,35 @@
               <a:rPr lang="en-US" sz="4800" dirty="0" err="1" smtClean="0"/>
               <a:t>xià</a:t>
             </a:r>
+            <a:r>
+              <a:rPr lang="en-US" sz="4800" dirty="0" smtClean="0"/>
+              <a:t> – </a:t>
+            </a:r>
+            <a:r>
+              <a:rPr lang="en-US" sz="4800" dirty="0" err="1" smtClean="0"/>
+              <a:t>giáng</a:t>
+            </a:r>
+            <a:r>
+              <a:rPr lang="en-US" sz="4800" dirty="0" smtClean="0"/>
+              <a:t> </a:t>
+            </a:r>
+            <a:r>
+              <a:rPr lang="en-US" sz="4800" dirty="0" err="1" smtClean="0"/>
+              <a:t>xuống</a:t>
+            </a:r>
             <a:endParaRPr lang="en-US" altLang="zh-CN" sz="4800" b="1" dirty="0" smtClean="0"/>
           </a:p>
           <a:p>
-            <a:pPr algn="ctr">
+            <a:pPr>
               <a:buNone/>
             </a:pPr>
             <a:r>
               <a:rPr lang="zh-CN" altLang="en-US" sz="4800" b="1" dirty="0" smtClean="0"/>
-              <a:t>賜福 </a:t>
+              <a:t>賜</a:t>
+            </a:r>
+            <a:r>
+              <a:rPr lang="zh-CN" altLang="en-US" sz="4800" b="1" dirty="0" smtClean="0"/>
+              <a:t>福 </a:t>
             </a:r>
             <a:r>
               <a:rPr lang="en-US" sz="4800" dirty="0" err="1" smtClean="0"/>
@@ -3476,6 +3572,14 @@
             <a:r>
               <a:rPr lang="en-US" sz="4800" dirty="0" err="1" smtClean="0"/>
               <a:t>fú</a:t>
+            </a:r>
+            <a:r>
+              <a:rPr lang="en-US" sz="4800" dirty="0" smtClean="0"/>
+              <a:t> – ban </a:t>
+            </a:r>
+            <a:r>
+              <a:rPr lang="en-US" sz="4800" dirty="0" err="1" smtClean="0"/>
+              <a:t>phước</a:t>
             </a:r>
             <a:endParaRPr lang="en-US" altLang="zh-CN" sz="4800" b="1" dirty="0" smtClean="0"/>
           </a:p>
@@ -3563,7 +3667,11 @@
             </a:pPr>
             <a:r>
               <a:rPr lang="zh-TW" altLang="en-US" sz="3600" b="1" dirty="0" smtClean="0"/>
-              <a:t>願主的恩惠慈愛與你同在，願主</a:t>
+              <a:t>願主的恩惠慈愛與你同在</a:t>
+            </a:r>
+            <a:r>
+              <a:rPr lang="zh-TW" altLang="en-US" sz="3600" b="1" dirty="0" smtClean="0"/>
+              <a:t>，</a:t>
             </a:r>
             <a:endParaRPr lang="en-US" altLang="zh-TW" sz="3600" b="1" dirty="0" smtClean="0"/>
           </a:p>
@@ -3578,8 +3686,12 @@
               <a:buNone/>
             </a:pPr>
             <a:r>
+              <a:rPr lang="zh-TW" altLang="en-US" sz="3600" b="1" dirty="0"/>
+              <a:t>願主的</a:t>
+            </a:r>
+            <a:r>
               <a:rPr lang="zh-TW" altLang="en-US" sz="3600" b="1" dirty="0" smtClean="0"/>
-              <a:t>的靈時時圍繞，</a:t>
+              <a:t>靈時時圍繞，</a:t>
             </a:r>
             <a:endParaRPr lang="en-US" altLang="zh-TW" sz="3600" b="1" dirty="0" smtClean="0"/>
           </a:p>
@@ -3625,8 +3737,8 @@
         </p:nvSpPr>
         <p:spPr>
           <a:xfrm>
-            <a:off x="1000100" y="2285992"/>
-            <a:ext cx="7500990" cy="369332"/>
+            <a:off x="1475656" y="2220962"/>
+            <a:ext cx="7100292" cy="369332"/>
           </a:xfrm>
           <a:prstGeom prst="rect">
             <a:avLst/>
@@ -3723,22 +3835,6 @@
               <a:rPr lang="en-US" b="1" dirty="0" err="1" smtClean="0"/>
               <a:t>zài</a:t>
             </a:r>
-            <a:r>
-              <a:rPr lang="en-US" b="1" dirty="0" smtClean="0"/>
-              <a:t>            </a:t>
-            </a:r>
-            <a:r>
-              <a:rPr lang="en-US" b="1" dirty="0" err="1" smtClean="0"/>
-              <a:t>yuàn</a:t>
-            </a:r>
-            <a:r>
-              <a:rPr lang="en-US" b="1" dirty="0" smtClean="0"/>
-              <a:t> </a:t>
-            </a:r>
-            <a:r>
-              <a:rPr lang="en-US" b="1" dirty="0" err="1" smtClean="0"/>
-              <a:t>zhǔ</a:t>
-            </a:r>
             <a:endParaRPr lang="zh-TW" altLang="en-US" b="1" dirty="0"/>
           </a:p>
         </p:txBody>
@@ -3751,8 +3847,8 @@
         </p:nvSpPr>
         <p:spPr>
           <a:xfrm>
-            <a:off x="2857488" y="3500438"/>
-            <a:ext cx="3286148" cy="369332"/>
+            <a:off x="2383451" y="3524015"/>
+            <a:ext cx="4162784" cy="369332"/>
           </a:xfrm>
           <a:prstGeom prst="rect">
             <a:avLst/>
@@ -3767,7 +3863,31 @@
           <a:p>
             <a:r>
               <a:rPr lang="en-US" b="1" dirty="0" smtClean="0"/>
-              <a:t>   De   </a:t>
+              <a:t> </a:t>
+            </a:r>
+            <a:r>
+              <a:rPr lang="en-US" b="1" dirty="0" err="1"/>
+              <a:t>yuàn</a:t>
+            </a:r>
+            <a:r>
+              <a:rPr lang="en-US" b="1" dirty="0"/>
+              <a:t> </a:t>
+            </a:r>
+            <a:r>
+              <a:rPr lang="en-US" b="1" dirty="0" err="1"/>
+              <a:t>zhǔ</a:t>
+            </a:r>
+            <a:r>
+              <a:rPr lang="en-US" b="1" dirty="0"/>
+              <a:t> </a:t>
+            </a:r>
+            <a:r>
+              <a:rPr lang="en-US" b="1" dirty="0" smtClean="0"/>
+              <a:t> </a:t>
+            </a:r>
+            <a:r>
+              <a:rPr lang="en-US" b="1" dirty="0" smtClean="0"/>
+              <a:t>De    </a:t>
             </a:r>
             <a:r>
               <a:rPr lang="en-US" b="1" dirty="0" err="1" smtClean="0"/>
@@ -3775,15 +3895,11 @@
             </a:r>
             <a:r>
               <a:rPr lang="en-US" b="1" dirty="0" smtClean="0"/>
-              <a:t>  </a:t>
-            </a:r>
-            <a:r>
-              <a:rPr lang="en-US" b="1" dirty="0" err="1"/>
+              <a:t>    </a:t>
+            </a:r>
+            <a:r>
+              <a:rPr lang="en-US" b="1" dirty="0" err="1" smtClean="0"/>
               <a:t>shí</a:t>
-            </a:r>
-            <a:r>
-              <a:rPr lang="en-US" b="1" dirty="0"/>
-              <a:t> </a:t>
             </a:r>
             <a:r>
               <a:rPr lang="en-US" b="1" dirty="0" smtClean="0"/>
@@ -4111,7 +4227,7 @@
             </a:pPr>
             <a:r>
               <a:rPr lang="zh-TW" altLang="en-US" sz="3600" b="1" dirty="0" smtClean="0"/>
-              <a:t>賜福與你，賜福與你，平安喜樂天天充</a:t>
+              <a:t>賜福與你，賜福與你，</a:t>
             </a:r>
             <a:endParaRPr lang="en-US" altLang="zh-TW" sz="3600" b="1" dirty="0" smtClean="0"/>
           </a:p>
@@ -4119,15 +4235,17 @@
             <a:pPr algn="ctr">
               <a:buNone/>
             </a:pPr>
-            <a:endParaRPr lang="en-US" altLang="zh-TW" sz="1600" b="1" dirty="0" smtClean="0"/>
-          </a:p>
-          <a:p>
-            <a:pPr algn="ctr">
-              <a:buNone/>
-            </a:pPr>
             <a:r>
               <a:rPr lang="zh-TW" altLang="en-US" sz="3600" b="1" dirty="0" smtClean="0"/>
-              <a:t>滿你。</a:t>
+              <a:t>平安喜樂天</a:t>
+            </a:r>
+            <a:r>
+              <a:rPr lang="zh-TW" altLang="en-US" sz="3600" b="1" smtClean="0"/>
+              <a:t>天充滿</a:t>
+            </a:r>
+            <a:r>
+              <a:rPr lang="zh-TW" altLang="en-US" sz="3600" b="1" dirty="0" smtClean="0"/>
+              <a:t>你。</a:t>
             </a:r>
           </a:p>
         </p:txBody>
@@ -4385,33 +4503,17 @@
             </a:pPr>
             <a:r>
               <a:rPr lang="zh-TW" altLang="en-US" sz="4400" b="1" dirty="0" smtClean="0"/>
-              <a:t>願</a:t>
-            </a:r>
+              <a:t>願主的恩惠慈愛與你同在</a:t>
+            </a:r>
+            <a:endParaRPr lang="en-US" altLang="zh-TW" sz="4400" b="1" dirty="0" smtClean="0"/>
+          </a:p>
+          <a:p>
+            <a:pPr algn="ctr">
+              <a:buNone/>
+            </a:pPr>
             <a:r>
               <a:rPr lang="zh-TW" altLang="en-US" sz="4400" b="1" dirty="0" smtClean="0"/>
-              <a:t>主的恩惠慈愛與你同</a:t>
-            </a:r>
-            <a:r>
-              <a:rPr lang="zh-TW" altLang="en-US" sz="4400" b="1" dirty="0" smtClean="0"/>
-              <a:t>在</a:t>
-            </a:r>
-            <a:endParaRPr lang="en-US" altLang="zh-TW" sz="4400" b="1" dirty="0" smtClean="0"/>
-          </a:p>
-          <a:p>
-            <a:pPr algn="ctr">
-              <a:buNone/>
-            </a:pPr>
-            <a:r>
-              <a:rPr lang="zh-TW" altLang="en-US" sz="4400" b="1" dirty="0" smtClean="0"/>
-              <a:t>願</a:t>
-            </a:r>
-            <a:r>
-              <a:rPr lang="zh-TW" altLang="en-US" sz="4400" b="1" dirty="0" smtClean="0"/>
-              <a:t>主的靈時時</a:t>
-            </a:r>
-            <a:r>
-              <a:rPr lang="zh-TW" altLang="en-US" sz="4400" b="1" dirty="0" smtClean="0"/>
-              <a:t>圍繞</a:t>
+              <a:t>願主的靈時時圍繞</a:t>
             </a:r>
             <a:endParaRPr lang="en-US" altLang="zh-TW" sz="4400" b="1" dirty="0" smtClean="0"/>
           </a:p>
@@ -4435,15 +4537,7 @@
             </a:r>
             <a:r>
               <a:rPr lang="zh-TW" altLang="en-US" sz="4400" b="1" dirty="0" smtClean="0"/>
-              <a:t>賜福</a:t>
-            </a:r>
-            <a:r>
-              <a:rPr lang="zh-TW" altLang="en-US" sz="4400" b="1" dirty="0" smtClean="0"/>
-              <a:t>與</a:t>
-            </a:r>
-            <a:r>
-              <a:rPr lang="zh-TW" altLang="en-US" sz="4400" b="1" dirty="0" smtClean="0"/>
-              <a:t>你</a:t>
+              <a:t>賜福與你</a:t>
             </a:r>
             <a:endParaRPr lang="en-US" altLang="zh-TW" sz="4400" b="1" dirty="0" smtClean="0"/>
           </a:p>
@@ -4461,19 +4555,11 @@
             </a:r>
             <a:r>
               <a:rPr lang="en-US" altLang="zh-TW" sz="4400" b="1" dirty="0" smtClean="0"/>
-              <a:t>	</a:t>
-            </a:r>
-            <a:r>
-              <a:rPr lang="en-US" altLang="zh-TW" sz="4400" b="1" dirty="0" smtClean="0"/>
-              <a:t>  </a:t>
+              <a:t>	  </a:t>
             </a:r>
             <a:r>
               <a:rPr lang="zh-TW" altLang="en-US" sz="4400" b="1" dirty="0" smtClean="0"/>
-              <a:t>天天</a:t>
-            </a:r>
-            <a:r>
-              <a:rPr lang="zh-TW" altLang="en-US" sz="4400" b="1" dirty="0" smtClean="0"/>
-              <a:t>充滿你。</a:t>
+              <a:t>天天充滿你。</a:t>
             </a:r>
             <a:endParaRPr lang="zh-TW" altLang="en-US" sz="4400" b="1" dirty="0"/>
           </a:p>
@@ -4622,23 +4708,11 @@
             </a:pPr>
             <a:r>
               <a:rPr lang="zh-TW" altLang="en-US" sz="4800" b="1" dirty="0" smtClean="0"/>
-              <a:t>賜福</a:t>
-            </a:r>
-            <a:r>
-              <a:rPr lang="zh-TW" altLang="en-US" sz="4800" b="1" dirty="0" smtClean="0"/>
-              <a:t>與</a:t>
-            </a:r>
-            <a:r>
-              <a:rPr lang="zh-TW" altLang="en-US" sz="4800" b="1" dirty="0" smtClean="0"/>
-              <a:t>你</a:t>
+              <a:t>賜福與你</a:t>
             </a:r>
             <a:r>
               <a:rPr lang="en-US" altLang="zh-TW" sz="4800" b="1" dirty="0" smtClean="0"/>
-              <a:t>	</a:t>
-            </a:r>
-            <a:r>
-              <a:rPr lang="en-US" altLang="zh-TW" sz="4800" b="1" dirty="0" smtClean="0"/>
-              <a:t>	</a:t>
+              <a:t>		</a:t>
             </a:r>
             <a:r>
               <a:rPr lang="zh-TW" altLang="en-US" sz="4800" b="1" dirty="0" smtClean="0"/>
@@ -4660,11 +4734,7 @@
             </a:r>
             <a:r>
               <a:rPr lang="zh-TW" altLang="en-US" sz="4800" b="1" dirty="0" smtClean="0"/>
-              <a:t>天天</a:t>
-            </a:r>
-            <a:r>
-              <a:rPr lang="zh-TW" altLang="en-US" sz="4800" b="1" dirty="0" smtClean="0"/>
-              <a:t>充滿你。</a:t>
+              <a:t>天天充滿你。</a:t>
             </a:r>
             <a:endParaRPr lang="en-US" altLang="zh-TW" sz="4800" b="1" dirty="0" smtClean="0"/>
           </a:p>

</xml_diff>